<commit_message>
ordered score items - MAB
</commit_message>
<xml_diff>
--- a/Data Analysis Details/CityZip_Presentation.pptx
+++ b/Data Analysis Details/CityZip_Presentation.pptx
@@ -111,6 +111,11 @@
       </a:defRPr>
     </a:lvl9pPr>
   </p:defaultTextStyle>
+  <p:extLst>
+    <p:ext uri="{EFAFB233-063F-42B5-8137-9DF3F51BA10A}">
+      <p15:sldGuideLst xmlns:p15="http://schemas.microsoft.com/office/powerpoint/2012/main"/>
+    </p:ext>
+  </p:extLst>
 </p:presentation>
 </file>
 
@@ -342,7 +347,7 @@
           <a:p>
             <a:fld id="{C6FBBC9C-A0B7-F449-A476-BA20E669D17A}" type="datetimeFigureOut">
               <a:rPr lang="en-US" smtClean="0"/>
-              <a:t>11/6/17</a:t>
+              <a:t>11/13/17</a:t>
             </a:fld>
             <a:endParaRPr lang="en-US"/>
           </a:p>
@@ -550,7 +555,7 @@
           <a:p>
             <a:fld id="{C6FBBC9C-A0B7-F449-A476-BA20E669D17A}" type="datetimeFigureOut">
               <a:rPr lang="en-US" smtClean="0"/>
-              <a:t>11/6/17</a:t>
+              <a:t>11/13/17</a:t>
             </a:fld>
             <a:endParaRPr lang="en-US"/>
           </a:p>
@@ -803,7 +808,7 @@
           <a:p>
             <a:fld id="{C6FBBC9C-A0B7-F449-A476-BA20E669D17A}" type="datetimeFigureOut">
               <a:rPr lang="en-US" smtClean="0"/>
-              <a:t>11/6/17</a:t>
+              <a:t>11/13/17</a:t>
             </a:fld>
             <a:endParaRPr lang="en-US"/>
           </a:p>
@@ -973,7 +978,7 @@
           <a:p>
             <a:fld id="{C6FBBC9C-A0B7-F449-A476-BA20E669D17A}" type="datetimeFigureOut">
               <a:rPr lang="en-US" smtClean="0"/>
-              <a:t>11/6/17</a:t>
+              <a:t>11/13/17</a:t>
             </a:fld>
             <a:endParaRPr lang="en-US"/>
           </a:p>
@@ -1305,7 +1310,7 @@
           <a:p>
             <a:fld id="{C6FBBC9C-A0B7-F449-A476-BA20E669D17A}" type="datetimeFigureOut">
               <a:rPr lang="en-US" smtClean="0"/>
-              <a:t>11/6/17</a:t>
+              <a:t>11/13/17</a:t>
             </a:fld>
             <a:endParaRPr lang="en-US"/>
           </a:p>
@@ -1580,7 +1585,7 @@
           <a:p>
             <a:fld id="{C6FBBC9C-A0B7-F449-A476-BA20E669D17A}" type="datetimeFigureOut">
               <a:rPr lang="en-US" smtClean="0"/>
-              <a:t>11/6/17</a:t>
+              <a:t>11/13/17</a:t>
             </a:fld>
             <a:endParaRPr lang="en-US"/>
           </a:p>
@@ -1963,7 +1968,7 @@
           <a:p>
             <a:fld id="{C6FBBC9C-A0B7-F449-A476-BA20E669D17A}" type="datetimeFigureOut">
               <a:rPr lang="en-US" smtClean="0"/>
-              <a:t>11/6/17</a:t>
+              <a:t>11/13/17</a:t>
             </a:fld>
             <a:endParaRPr lang="en-US"/>
           </a:p>
@@ -2081,7 +2086,7 @@
           <a:p>
             <a:fld id="{C6FBBC9C-A0B7-F449-A476-BA20E669D17A}" type="datetimeFigureOut">
               <a:rPr lang="en-US" smtClean="0"/>
-              <a:t>11/6/17</a:t>
+              <a:t>11/13/17</a:t>
             </a:fld>
             <a:endParaRPr lang="en-US"/>
           </a:p>
@@ -2249,7 +2254,7 @@
           <a:p>
             <a:fld id="{C6FBBC9C-A0B7-F449-A476-BA20E669D17A}" type="datetimeFigureOut">
               <a:rPr lang="en-US" smtClean="0"/>
-              <a:t>11/6/17</a:t>
+              <a:t>11/13/17</a:t>
             </a:fld>
             <a:endParaRPr lang="en-US"/>
           </a:p>
@@ -2605,7 +2610,7 @@
           <a:p>
             <a:fld id="{C6FBBC9C-A0B7-F449-A476-BA20E669D17A}" type="datetimeFigureOut">
               <a:rPr lang="en-US" smtClean="0"/>
-              <a:t>11/6/17</a:t>
+              <a:t>11/13/17</a:t>
             </a:fld>
             <a:endParaRPr lang="en-US"/>
           </a:p>
@@ -2953,7 +2958,7 @@
           <a:p>
             <a:fld id="{C6FBBC9C-A0B7-F449-A476-BA20E669D17A}" type="datetimeFigureOut">
               <a:rPr lang="en-US" smtClean="0"/>
-              <a:t>11/6/17</a:t>
+              <a:t>11/13/17</a:t>
             </a:fld>
             <a:endParaRPr lang="en-US"/>
           </a:p>
@@ -3264,7 +3269,7 @@
           <a:p>
             <a:fld id="{C6FBBC9C-A0B7-F449-A476-BA20E669D17A}" type="datetimeFigureOut">
               <a:rPr lang="en-US" smtClean="0"/>
-              <a:t>11/6/17</a:t>
+              <a:t>11/13/17</a:t>
             </a:fld>
             <a:endParaRPr lang="en-US"/>
           </a:p>
@@ -5017,14 +5022,14 @@
           <p:nvPr>
             <p:extLst>
               <p:ext uri="{D42A27DB-BD31-4B8C-83A1-F6EECF244321}">
-                <p14:modId xmlns:p14="http://schemas.microsoft.com/office/powerpoint/2010/main" val="1752540383"/>
+                <p14:modId xmlns:p14="http://schemas.microsoft.com/office/powerpoint/2010/main" val="1317805652"/>
               </p:ext>
             </p:extLst>
           </p:nvPr>
         </p:nvGraphicFramePr>
         <p:xfrm>
           <a:off x="1150129" y="2316117"/>
-          <a:ext cx="6843742" cy="3895263"/>
+          <a:ext cx="6843742" cy="3834392"/>
         </p:xfrm>
         <a:graphic>
           <a:graphicData uri="http://schemas.openxmlformats.org/drawingml/2006/table">
@@ -5092,7 +5097,11 @@
                     <a:p>
                       <a:r>
                         <a:rPr lang="en-US" sz="1600" dirty="0" smtClean="0"/>
-                        <a:t>Real Estate Market Health</a:t>
+                        <a:t>Points</a:t>
+                      </a:r>
+                      <a:r>
+                        <a:rPr lang="en-US" sz="1600" baseline="0" dirty="0" smtClean="0"/>
+                        <a:t> of Interest Count</a:t>
                       </a:r>
                       <a:endParaRPr lang="en-US" sz="1600" b="0" dirty="0"/>
                     </a:p>
@@ -5107,7 +5116,7 @@
                       <a:pPr algn="ctr"/>
                       <a:r>
                         <a:rPr lang="en-US" sz="1600" dirty="0" smtClean="0"/>
-                        <a:t>.05</a:t>
+                        <a:t>.30</a:t>
                       </a:r>
                       <a:endParaRPr lang="en-US" sz="1600" b="0" dirty="0"/>
                     </a:p>
@@ -5122,7 +5131,7 @@
                       <a:pPr algn="ctr"/>
                       <a:r>
                         <a:rPr lang="en-US" sz="1600" b="0" dirty="0" smtClean="0"/>
-                        <a:t>Strong Market</a:t>
+                        <a:t>High Count</a:t>
                       </a:r>
                       <a:endParaRPr lang="en-US" sz="1600" b="0" dirty="0"/>
                     </a:p>
@@ -5136,11 +5145,28 @@
                     <a:bodyPr/>
                     <a:lstStyle/>
                     <a:p>
+                      <a:pPr marL="0" marR="0" indent="0" algn="l" defTabSz="914400" rtl="0" eaLnBrk="1" fontAlgn="auto" latinLnBrk="0" hangingPunct="1">
+                        <a:lnSpc>
+                          <a:spcPct val="100000"/>
+                        </a:lnSpc>
+                        <a:spcBef>
+                          <a:spcPts val="0"/>
+                        </a:spcBef>
+                        <a:spcAft>
+                          <a:spcPts val="0"/>
+                        </a:spcAft>
+                        <a:buClrTx/>
+                        <a:buSzTx/>
+                        <a:buFontTx/>
+                        <a:buNone/>
+                        <a:tabLst/>
+                        <a:defRPr/>
+                      </a:pPr>
                       <a:r>
                         <a:rPr lang="en-US" sz="1600" dirty="0" smtClean="0"/>
-                        <a:t>Home Value</a:t>
+                        <a:t>Crime Risk</a:t>
                       </a:r>
-                      <a:endParaRPr lang="en-US" sz="1600" b="0" dirty="0"/>
+                      <a:endParaRPr lang="en-US" sz="1600" b="0" dirty="0" smtClean="0"/>
                     </a:p>
                   </a:txBody>
                   <a:tcPr/>
@@ -5153,7 +5179,7 @@
                       <a:pPr algn="ctr"/>
                       <a:r>
                         <a:rPr lang="en-US" sz="1600" dirty="0" smtClean="0"/>
-                        <a:t>.05</a:t>
+                        <a:t>.15</a:t>
                       </a:r>
                       <a:endParaRPr lang="en-US" sz="1600" b="0" dirty="0"/>
                     </a:p>
@@ -5165,66 +5191,32 @@
                     <a:bodyPr/>
                     <a:lstStyle/>
                     <a:p>
-                      <a:pPr algn="ctr"/>
+                      <a:pPr marL="0" marR="0" indent="0" algn="ctr" defTabSz="914400" rtl="0" eaLnBrk="1" fontAlgn="auto" latinLnBrk="0" hangingPunct="1">
+                        <a:lnSpc>
+                          <a:spcPct val="100000"/>
+                        </a:lnSpc>
+                        <a:spcBef>
+                          <a:spcPts val="0"/>
+                        </a:spcBef>
+                        <a:spcAft>
+                          <a:spcPts val="0"/>
+                        </a:spcAft>
+                        <a:buClrTx/>
+                        <a:buSzTx/>
+                        <a:buFontTx/>
+                        <a:buNone/>
+                        <a:tabLst/>
+                        <a:defRPr/>
+                      </a:pPr>
                       <a:r>
                         <a:rPr lang="en-US" sz="1600" b="0" dirty="0" smtClean="0"/>
-                        <a:t>Compared</a:t>
+                        <a:t>Low</a:t>
                       </a:r>
                       <a:r>
                         <a:rPr lang="en-US" sz="1600" b="0" baseline="0" dirty="0" smtClean="0"/>
-                        <a:t> to National Average</a:t>
+                        <a:t> Risk</a:t>
                       </a:r>
-                      <a:endParaRPr lang="en-US" sz="1600" b="0" dirty="0"/>
-                    </a:p>
-                  </a:txBody>
-                  <a:tcPr/>
-                </a:tc>
-              </a:tr>
-              <a:tr h="341205">
-                <a:tc>
-                  <a:txBody>
-                    <a:bodyPr/>
-                    <a:lstStyle/>
-                    <a:p>
-                      <a:r>
-                        <a:rPr lang="en-US" sz="1600" baseline="0" dirty="0" smtClean="0"/>
-                        <a:t>Rent</a:t>
-                      </a:r>
-                      <a:endParaRPr lang="en-US" sz="1600" b="0" dirty="0"/>
-                    </a:p>
-                  </a:txBody>
-                  <a:tcPr/>
-                </a:tc>
-                <a:tc>
-                  <a:txBody>
-                    <a:bodyPr/>
-                    <a:lstStyle/>
-                    <a:p>
-                      <a:pPr algn="ctr"/>
-                      <a:r>
-                        <a:rPr lang="en-US" sz="1600" dirty="0" smtClean="0"/>
-                        <a:t>.05</a:t>
-                      </a:r>
-                      <a:endParaRPr lang="en-US" sz="1600" b="0" dirty="0"/>
-                    </a:p>
-                  </a:txBody>
-                  <a:tcPr/>
-                </a:tc>
-                <a:tc>
-                  <a:txBody>
-                    <a:bodyPr/>
-                    <a:lstStyle/>
-                    <a:p>
-                      <a:pPr algn="ctr"/>
-                      <a:r>
-                        <a:rPr lang="en-US" sz="1600" b="0" dirty="0" smtClean="0"/>
-                        <a:t>Compared</a:t>
-                      </a:r>
-                      <a:r>
-                        <a:rPr lang="en-US" sz="1600" b="0" baseline="0" dirty="0" smtClean="0"/>
-                        <a:t> to National Average</a:t>
-                      </a:r>
-                      <a:endParaRPr lang="en-US" sz="1600" b="0" dirty="0"/>
+                      <a:endParaRPr lang="en-US" sz="1600" b="0" dirty="0" smtClean="0"/>
                     </a:p>
                   </a:txBody>
                   <a:tcPr/>
@@ -5288,52 +5280,6 @@
                     <a:p>
                       <a:r>
                         <a:rPr lang="en-US" sz="1600" dirty="0" smtClean="0"/>
-                        <a:t>Walkability</a:t>
-                      </a:r>
-                      <a:endParaRPr lang="en-US" sz="1600" b="0" dirty="0"/>
-                    </a:p>
-                  </a:txBody>
-                  <a:tcPr/>
-                </a:tc>
-                <a:tc>
-                  <a:txBody>
-                    <a:bodyPr/>
-                    <a:lstStyle/>
-                    <a:p>
-                      <a:pPr algn="ctr"/>
-                      <a:r>
-                        <a:rPr lang="en-US" sz="1600" dirty="0" smtClean="0"/>
-                        <a:t>.05</a:t>
-                      </a:r>
-                      <a:endParaRPr lang="en-US" sz="1600" b="0" dirty="0"/>
-                    </a:p>
-                  </a:txBody>
-                  <a:tcPr/>
-                </a:tc>
-                <a:tc>
-                  <a:txBody>
-                    <a:bodyPr/>
-                    <a:lstStyle/>
-                    <a:p>
-                      <a:pPr algn="ctr"/>
-                      <a:r>
-                        <a:rPr lang="en-US" sz="1600" b="0" dirty="0" smtClean="0"/>
-                        <a:t>Pedestrian Friendliness</a:t>
-                      </a:r>
-                      <a:endParaRPr lang="en-US" sz="1600" b="0" dirty="0"/>
-                    </a:p>
-                  </a:txBody>
-                  <a:tcPr/>
-                </a:tc>
-              </a:tr>
-              <a:tr h="341205">
-                <a:tc>
-                  <a:txBody>
-                    <a:bodyPr/>
-                    <a:lstStyle/>
-                    <a:p>
-                      <a:r>
-                        <a:rPr lang="en-US" sz="1600" dirty="0" smtClean="0"/>
                         <a:t>School Count</a:t>
                       </a:r>
                       <a:endParaRPr lang="en-US" sz="1600" b="0" dirty="0"/>
@@ -5369,102 +5315,6 @@
                       <a:r>
                         <a:rPr lang="en-US" sz="1600" b="0" baseline="0" dirty="0" smtClean="0"/>
                         <a:t> Count</a:t>
-                      </a:r>
-                      <a:endParaRPr lang="en-US" sz="1600" b="0" dirty="0"/>
-                    </a:p>
-                  </a:txBody>
-                  <a:tcPr/>
-                </a:tc>
-              </a:tr>
-              <a:tr h="402076">
-                <a:tc>
-                  <a:txBody>
-                    <a:bodyPr/>
-                    <a:lstStyle/>
-                    <a:p>
-                      <a:r>
-                        <a:rPr lang="en-US" sz="1600" dirty="0" smtClean="0"/>
-                        <a:t>Points</a:t>
-                      </a:r>
-                      <a:r>
-                        <a:rPr lang="en-US" sz="1600" baseline="0" dirty="0" smtClean="0"/>
-                        <a:t> of Interest Count</a:t>
-                      </a:r>
-                      <a:endParaRPr lang="en-US" sz="1600" b="0" dirty="0"/>
-                    </a:p>
-                  </a:txBody>
-                  <a:tcPr/>
-                </a:tc>
-                <a:tc>
-                  <a:txBody>
-                    <a:bodyPr/>
-                    <a:lstStyle/>
-                    <a:p>
-                      <a:pPr algn="ctr"/>
-                      <a:r>
-                        <a:rPr lang="en-US" sz="1600" dirty="0" smtClean="0"/>
-                        <a:t>.30</a:t>
-                      </a:r>
-                      <a:endParaRPr lang="en-US" sz="1600" b="0" dirty="0"/>
-                    </a:p>
-                  </a:txBody>
-                  <a:tcPr/>
-                </a:tc>
-                <a:tc>
-                  <a:txBody>
-                    <a:bodyPr/>
-                    <a:lstStyle/>
-                    <a:p>
-                      <a:pPr algn="ctr"/>
-                      <a:r>
-                        <a:rPr lang="en-US" sz="1600" b="0" dirty="0" smtClean="0"/>
-                        <a:t>High Count</a:t>
-                      </a:r>
-                      <a:endParaRPr lang="en-US" sz="1600" b="0" dirty="0"/>
-                    </a:p>
-                  </a:txBody>
-                  <a:tcPr/>
-                </a:tc>
-              </a:tr>
-              <a:tr h="341205">
-                <a:tc>
-                  <a:txBody>
-                    <a:bodyPr/>
-                    <a:lstStyle/>
-                    <a:p>
-                      <a:r>
-                        <a:rPr lang="en-US" sz="1600" dirty="0" smtClean="0"/>
-                        <a:t>Sales Tax</a:t>
-                      </a:r>
-                      <a:endParaRPr lang="en-US" sz="1600" b="0" dirty="0"/>
-                    </a:p>
-                  </a:txBody>
-                  <a:tcPr/>
-                </a:tc>
-                <a:tc>
-                  <a:txBody>
-                    <a:bodyPr/>
-                    <a:lstStyle/>
-                    <a:p>
-                      <a:pPr algn="ctr"/>
-                      <a:r>
-                        <a:rPr lang="en-US" sz="1600" dirty="0" smtClean="0"/>
-                        <a:t>.05</a:t>
-                      </a:r>
-                      <a:endParaRPr lang="en-US" sz="1600" b="0" dirty="0"/>
-                    </a:p>
-                  </a:txBody>
-                  <a:tcPr/>
-                </a:tc>
-                <a:tc>
-                  <a:txBody>
-                    <a:bodyPr/>
-                    <a:lstStyle/>
-                    <a:p>
-                      <a:pPr algn="ctr"/>
-                      <a:r>
-                        <a:rPr lang="en-US" sz="1600" b="0" dirty="0" smtClean="0"/>
-                        <a:t>Low Tax Rate</a:t>
                       </a:r>
                       <a:endParaRPr lang="en-US" sz="1600" b="0" dirty="0"/>
                     </a:p>
@@ -5510,7 +5360,11 @@
                       <a:pPr algn="ctr"/>
                       <a:r>
                         <a:rPr lang="en-US" sz="1600" b="0" dirty="0" smtClean="0"/>
-                        <a:t>Moderate growth</a:t>
+                        <a:t>Moderate </a:t>
+                      </a:r>
+                      <a:r>
+                        <a:rPr lang="en-US" sz="1600" b="0" dirty="0" smtClean="0"/>
+                        <a:t>Growth</a:t>
                       </a:r>
                       <a:endParaRPr lang="en-US" sz="1600" b="0" dirty="0"/>
                     </a:p>
@@ -5525,8 +5379,8 @@
                     <a:lstStyle/>
                     <a:p>
                       <a:r>
-                        <a:rPr lang="en-US" sz="1600" dirty="0" smtClean="0"/>
-                        <a:t>Crime Risk</a:t>
+                        <a:rPr lang="en-US" sz="1600" baseline="0" dirty="0" smtClean="0"/>
+                        <a:t>Home Value</a:t>
                       </a:r>
                       <a:endParaRPr lang="en-US" sz="1600" b="0" dirty="0"/>
                     </a:p>
@@ -5541,7 +5395,7 @@
                       <a:pPr algn="ctr"/>
                       <a:r>
                         <a:rPr lang="en-US" sz="1600" dirty="0" smtClean="0"/>
-                        <a:t>.15</a:t>
+                        <a:t>.05</a:t>
                       </a:r>
                       <a:endParaRPr lang="en-US" sz="1600" b="0" dirty="0"/>
                     </a:p>
@@ -5556,13 +5410,278 @@
                       <a:pPr algn="ctr"/>
                       <a:r>
                         <a:rPr lang="en-US" sz="1600" b="0" dirty="0" smtClean="0"/>
-                        <a:t>Low</a:t>
+                        <a:t>Compared</a:t>
                       </a:r>
                       <a:r>
                         <a:rPr lang="en-US" sz="1600" b="0" baseline="0" dirty="0" smtClean="0"/>
-                        <a:t> Risk</a:t>
+                        <a:t> to National Average</a:t>
                       </a:r>
                       <a:endParaRPr lang="en-US" sz="1600" b="0" dirty="0"/>
+                    </a:p>
+                  </a:txBody>
+                  <a:tcPr/>
+                </a:tc>
+              </a:tr>
+              <a:tr h="341205">
+                <a:tc>
+                  <a:txBody>
+                    <a:bodyPr/>
+                    <a:lstStyle/>
+                    <a:p>
+                      <a:pPr marL="0" marR="0" indent="0" algn="l" defTabSz="914400" rtl="0" eaLnBrk="1" fontAlgn="auto" latinLnBrk="0" hangingPunct="1">
+                        <a:lnSpc>
+                          <a:spcPct val="100000"/>
+                        </a:lnSpc>
+                        <a:spcBef>
+                          <a:spcPts val="0"/>
+                        </a:spcBef>
+                        <a:spcAft>
+                          <a:spcPts val="0"/>
+                        </a:spcAft>
+                        <a:buClrTx/>
+                        <a:buSzTx/>
+                        <a:buFontTx/>
+                        <a:buNone/>
+                        <a:tabLst/>
+                        <a:defRPr/>
+                      </a:pPr>
+                      <a:r>
+                        <a:rPr lang="en-US" sz="1600" dirty="0" smtClean="0"/>
+                        <a:t>Monthly</a:t>
+                      </a:r>
+                      <a:r>
+                        <a:rPr lang="en-US" sz="1600" baseline="0" dirty="0" smtClean="0"/>
+                        <a:t> Rent</a:t>
+                      </a:r>
+                      <a:endParaRPr lang="en-US" sz="1600" b="0" dirty="0" smtClean="0"/>
+                    </a:p>
+                  </a:txBody>
+                  <a:tcPr/>
+                </a:tc>
+                <a:tc>
+                  <a:txBody>
+                    <a:bodyPr/>
+                    <a:lstStyle/>
+                    <a:p>
+                      <a:pPr algn="ctr"/>
+                      <a:r>
+                        <a:rPr lang="en-US" sz="1600" dirty="0" smtClean="0"/>
+                        <a:t>.05</a:t>
+                      </a:r>
+                      <a:endParaRPr lang="en-US" sz="1600" b="0" dirty="0"/>
+                    </a:p>
+                  </a:txBody>
+                  <a:tcPr/>
+                </a:tc>
+                <a:tc>
+                  <a:txBody>
+                    <a:bodyPr/>
+                    <a:lstStyle/>
+                    <a:p>
+                      <a:pPr marL="0" marR="0" indent="0" algn="ctr" defTabSz="914400" rtl="0" eaLnBrk="1" fontAlgn="auto" latinLnBrk="0" hangingPunct="1">
+                        <a:lnSpc>
+                          <a:spcPct val="100000"/>
+                        </a:lnSpc>
+                        <a:spcBef>
+                          <a:spcPts val="0"/>
+                        </a:spcBef>
+                        <a:spcAft>
+                          <a:spcPts val="0"/>
+                        </a:spcAft>
+                        <a:buClrTx/>
+                        <a:buSzTx/>
+                        <a:buFontTx/>
+                        <a:buNone/>
+                        <a:tabLst/>
+                        <a:defRPr/>
+                      </a:pPr>
+                      <a:r>
+                        <a:rPr lang="en-US" sz="1600" b="0" dirty="0" smtClean="0"/>
+                        <a:t>Compared</a:t>
+                      </a:r>
+                      <a:r>
+                        <a:rPr lang="en-US" sz="1600" b="0" baseline="0" dirty="0" smtClean="0"/>
+                        <a:t> to National Average</a:t>
+                      </a:r>
+                      <a:endParaRPr lang="en-US" sz="1600" b="0" dirty="0" smtClean="0"/>
+                    </a:p>
+                  </a:txBody>
+                  <a:tcPr/>
+                </a:tc>
+              </a:tr>
+              <a:tr h="341205">
+                <a:tc>
+                  <a:txBody>
+                    <a:bodyPr/>
+                    <a:lstStyle/>
+                    <a:p>
+                      <a:r>
+                        <a:rPr lang="en-US" sz="1600" b="0" dirty="0" smtClean="0"/>
+                        <a:t>Real</a:t>
+                      </a:r>
+                      <a:r>
+                        <a:rPr lang="en-US" sz="1600" b="0" baseline="0" dirty="0" smtClean="0"/>
+                        <a:t> Estate Market Health</a:t>
+                      </a:r>
+                      <a:endParaRPr lang="en-US" sz="1600" b="0" dirty="0"/>
+                    </a:p>
+                  </a:txBody>
+                  <a:tcPr/>
+                </a:tc>
+                <a:tc>
+                  <a:txBody>
+                    <a:bodyPr/>
+                    <a:lstStyle/>
+                    <a:p>
+                      <a:pPr algn="ctr"/>
+                      <a:r>
+                        <a:rPr lang="en-US" sz="1600" dirty="0" smtClean="0"/>
+                        <a:t>.05</a:t>
+                      </a:r>
+                      <a:endParaRPr lang="en-US" sz="1600" b="0" dirty="0"/>
+                    </a:p>
+                  </a:txBody>
+                  <a:tcPr/>
+                </a:tc>
+                <a:tc>
+                  <a:txBody>
+                    <a:bodyPr/>
+                    <a:lstStyle/>
+                    <a:p>
+                      <a:pPr algn="ctr"/>
+                      <a:r>
+                        <a:rPr lang="en-US" sz="1600" b="0" dirty="0" smtClean="0"/>
+                        <a:t>Strong Market</a:t>
+                      </a:r>
+                      <a:endParaRPr lang="en-US" sz="1600" b="0" dirty="0"/>
+                    </a:p>
+                  </a:txBody>
+                  <a:tcPr/>
+                </a:tc>
+              </a:tr>
+              <a:tr h="341205">
+                <a:tc>
+                  <a:txBody>
+                    <a:bodyPr/>
+                    <a:lstStyle/>
+                    <a:p>
+                      <a:r>
+                        <a:rPr lang="en-US" sz="1600" b="0" dirty="0" smtClean="0"/>
+                        <a:t>Sales Tax</a:t>
+                      </a:r>
+                      <a:endParaRPr lang="en-US" sz="1600" b="0" dirty="0"/>
+                    </a:p>
+                  </a:txBody>
+                  <a:tcPr/>
+                </a:tc>
+                <a:tc>
+                  <a:txBody>
+                    <a:bodyPr/>
+                    <a:lstStyle/>
+                    <a:p>
+                      <a:pPr algn="ctr"/>
+                      <a:r>
+                        <a:rPr lang="en-US" sz="1600" dirty="0" smtClean="0"/>
+                        <a:t>.05</a:t>
+                      </a:r>
+                      <a:endParaRPr lang="en-US" sz="1600" b="0" dirty="0"/>
+                    </a:p>
+                  </a:txBody>
+                  <a:tcPr/>
+                </a:tc>
+                <a:tc>
+                  <a:txBody>
+                    <a:bodyPr/>
+                    <a:lstStyle/>
+                    <a:p>
+                      <a:pPr algn="ctr"/>
+                      <a:r>
+                        <a:rPr lang="en-US" sz="1600" b="0" dirty="0" smtClean="0"/>
+                        <a:t>Low Tax</a:t>
+                      </a:r>
+                      <a:r>
+                        <a:rPr lang="en-US" sz="1600" b="0" baseline="0" dirty="0" smtClean="0"/>
+                        <a:t> Rate</a:t>
+                      </a:r>
+                      <a:endParaRPr lang="en-US" sz="1600" b="0" dirty="0"/>
+                    </a:p>
+                  </a:txBody>
+                  <a:tcPr/>
+                </a:tc>
+              </a:tr>
+              <a:tr h="341205">
+                <a:tc>
+                  <a:txBody>
+                    <a:bodyPr/>
+                    <a:lstStyle/>
+                    <a:p>
+                      <a:pPr marL="0" marR="0" indent="0" algn="l" defTabSz="914400" rtl="0" eaLnBrk="1" fontAlgn="auto" latinLnBrk="0" hangingPunct="1">
+                        <a:lnSpc>
+                          <a:spcPct val="100000"/>
+                        </a:lnSpc>
+                        <a:spcBef>
+                          <a:spcPts val="0"/>
+                        </a:spcBef>
+                        <a:spcAft>
+                          <a:spcPts val="0"/>
+                        </a:spcAft>
+                        <a:buClrTx/>
+                        <a:buSzTx/>
+                        <a:buFontTx/>
+                        <a:buNone/>
+                        <a:tabLst/>
+                        <a:defRPr/>
+                      </a:pPr>
+                      <a:r>
+                        <a:rPr lang="en-US" sz="1600" dirty="0" smtClean="0"/>
+                        <a:t>Walkability</a:t>
+                      </a:r>
+                      <a:endParaRPr lang="en-US" sz="1600" b="0" dirty="0" smtClean="0"/>
+                    </a:p>
+                  </a:txBody>
+                  <a:tcPr/>
+                </a:tc>
+                <a:tc>
+                  <a:txBody>
+                    <a:bodyPr/>
+                    <a:lstStyle/>
+                    <a:p>
+                      <a:pPr algn="ctr"/>
+                      <a:r>
+                        <a:rPr lang="en-US" sz="1600" b="0" dirty="0" smtClean="0"/>
+                        <a:t>.05</a:t>
+                      </a:r>
+                      <a:endParaRPr lang="en-US" sz="1600" b="0" dirty="0"/>
+                    </a:p>
+                  </a:txBody>
+                  <a:tcPr/>
+                </a:tc>
+                <a:tc>
+                  <a:txBody>
+                    <a:bodyPr/>
+                    <a:lstStyle/>
+                    <a:p>
+                      <a:pPr marL="0" marR="0" indent="0" algn="ctr" defTabSz="914400" rtl="0" eaLnBrk="1" fontAlgn="auto" latinLnBrk="0" hangingPunct="1">
+                        <a:lnSpc>
+                          <a:spcPct val="100000"/>
+                        </a:lnSpc>
+                        <a:spcBef>
+                          <a:spcPts val="0"/>
+                        </a:spcBef>
+                        <a:spcAft>
+                          <a:spcPts val="0"/>
+                        </a:spcAft>
+                        <a:buClrTx/>
+                        <a:buSzTx/>
+                        <a:buFontTx/>
+                        <a:buNone/>
+                        <a:tabLst/>
+                        <a:defRPr/>
+                      </a:pPr>
+                      <a:r>
+                        <a:rPr lang="en-US" sz="1600" b="0" dirty="0" smtClean="0"/>
+                        <a:t>Pedestrian Friendly</a:t>
+                      </a:r>
                     </a:p>
                   </a:txBody>
                   <a:tcPr/>
@@ -5599,7 +5718,6 @@
               <a:rPr lang="en-US" sz="2000" dirty="0" smtClean="0"/>
               <a:t>10 variables are defined to produce a total score from 0 to 100</a:t>
             </a:r>
-            <a:endParaRPr lang="en-US" sz="2000" dirty="0" smtClean="0"/>
           </a:p>
         </p:txBody>
       </p:sp>

</xml_diff>